<commit_message>
added picture to preview slide
</commit_message>
<xml_diff>
--- a/aspire_preview.pptx
+++ b/aspire_preview.pptx
@@ -192,7 +192,7 @@
           <a:p>
             <a:fld id="{C0783E2D-688F-4C78-8A82-0D3B92D958DC}" type="datetimeFigureOut">
               <a:rPr lang="en-US" smtClean="0"/>
-              <a:t>12/29/2013</a:t>
+              <a:t>1/2/14</a:t>
             </a:fld>
             <a:endParaRPr lang="en-US"/>
           </a:p>
@@ -731,7 +731,7 @@
           <a:p>
             <a:fld id="{A8FF2306-292D-41C8-8AE3-F53CB7571D2B}" type="datetimeFigureOut">
               <a:rPr lang="en-US" smtClean="0"/>
-              <a:t>12/29/2013</a:t>
+              <a:t>1/2/14</a:t>
             </a:fld>
             <a:endParaRPr lang="en-US"/>
           </a:p>
@@ -911,7 +911,7 @@
           <a:p>
             <a:fld id="{A8FF2306-292D-41C8-8AE3-F53CB7571D2B}" type="datetimeFigureOut">
               <a:rPr lang="en-US" smtClean="0"/>
-              <a:t>12/29/2013</a:t>
+              <a:t>1/2/14</a:t>
             </a:fld>
             <a:endParaRPr lang="en-US"/>
           </a:p>
@@ -1081,7 +1081,7 @@
           <a:p>
             <a:fld id="{A8FF2306-292D-41C8-8AE3-F53CB7571D2B}" type="datetimeFigureOut">
               <a:rPr lang="en-US" smtClean="0"/>
-              <a:t>12/29/2013</a:t>
+              <a:t>1/2/14</a:t>
             </a:fld>
             <a:endParaRPr lang="en-US"/>
           </a:p>
@@ -1327,7 +1327,7 @@
           <a:p>
             <a:fld id="{A8FF2306-292D-41C8-8AE3-F53CB7571D2B}" type="datetimeFigureOut">
               <a:rPr lang="en-US" smtClean="0"/>
-              <a:t>12/29/2013</a:t>
+              <a:t>1/2/14</a:t>
             </a:fld>
             <a:endParaRPr lang="en-US"/>
           </a:p>
@@ -1615,7 +1615,7 @@
           <a:p>
             <a:fld id="{A8FF2306-292D-41C8-8AE3-F53CB7571D2B}" type="datetimeFigureOut">
               <a:rPr lang="en-US" smtClean="0"/>
-              <a:t>12/29/2013</a:t>
+              <a:t>1/2/14</a:t>
             </a:fld>
             <a:endParaRPr lang="en-US"/>
           </a:p>
@@ -2037,7 +2037,7 @@
           <a:p>
             <a:fld id="{A8FF2306-292D-41C8-8AE3-F53CB7571D2B}" type="datetimeFigureOut">
               <a:rPr lang="en-US" smtClean="0"/>
-              <a:t>12/29/2013</a:t>
+              <a:t>1/2/14</a:t>
             </a:fld>
             <a:endParaRPr lang="en-US"/>
           </a:p>
@@ -2155,7 +2155,7 @@
           <a:p>
             <a:fld id="{A8FF2306-292D-41C8-8AE3-F53CB7571D2B}" type="datetimeFigureOut">
               <a:rPr lang="en-US" smtClean="0"/>
-              <a:t>12/29/2013</a:t>
+              <a:t>1/2/14</a:t>
             </a:fld>
             <a:endParaRPr lang="en-US"/>
           </a:p>
@@ -2250,7 +2250,7 @@
           <a:p>
             <a:fld id="{A8FF2306-292D-41C8-8AE3-F53CB7571D2B}" type="datetimeFigureOut">
               <a:rPr lang="en-US" smtClean="0"/>
-              <a:t>12/29/2013</a:t>
+              <a:t>1/2/14</a:t>
             </a:fld>
             <a:endParaRPr lang="en-US"/>
           </a:p>
@@ -2527,7 +2527,7 @@
           <a:p>
             <a:fld id="{A8FF2306-292D-41C8-8AE3-F53CB7571D2B}" type="datetimeFigureOut">
               <a:rPr lang="en-US" smtClean="0"/>
-              <a:t>12/29/2013</a:t>
+              <a:t>1/2/14</a:t>
             </a:fld>
             <a:endParaRPr lang="en-US"/>
           </a:p>
@@ -2780,7 +2780,7 @@
           <a:p>
             <a:fld id="{A8FF2306-292D-41C8-8AE3-F53CB7571D2B}" type="datetimeFigureOut">
               <a:rPr lang="en-US" smtClean="0"/>
-              <a:t>12/29/2013</a:t>
+              <a:t>1/2/14</a:t>
             </a:fld>
             <a:endParaRPr lang="en-US"/>
           </a:p>
@@ -2993,7 +2993,7 @@
           <a:p>
             <a:fld id="{A8FF2306-292D-41C8-8AE3-F53CB7571D2B}" type="datetimeFigureOut">
               <a:rPr lang="en-US" smtClean="0"/>
-              <a:t>12/29/2013</a:t>
+              <a:t>1/2/14</a:t>
             </a:fld>
             <a:endParaRPr lang="en-US"/>
           </a:p>
@@ -3691,9 +3691,6 @@
               </a:rPr>
               <a:t>Written in Chisel</a:t>
             </a:r>
-            <a:endParaRPr lang="en-US" sz="2000" dirty="0" smtClean="0">
-              <a:ea typeface="ＭＳ Ｐゴシック" charset="-128"/>
-            </a:endParaRPr>
           </a:p>
           <a:p>
             <a:endParaRPr lang="en-US" sz="2400" dirty="0" smtClean="0">
@@ -3712,7 +3709,7 @@
         </p:nvSpPr>
         <p:spPr bwMode="auto">
           <a:xfrm>
-            <a:off x="6400800" y="3588327"/>
+            <a:off x="6248400" y="3588327"/>
             <a:ext cx="3505200" cy="617913"/>
           </a:xfrm>
           <a:prstGeom prst="rect">
@@ -4075,6 +4072,36 @@
           </a:prstGeom>
         </p:spPr>
       </p:pic>
+      <p:pic>
+        <p:nvPicPr>
+          <p:cNvPr id="8" name="Picture 7" descr="KevinLinger.jpg"/>
+          <p:cNvPicPr>
+            <a:picLocks noChangeAspect="1"/>
+          </p:cNvPicPr>
+          <p:nvPr/>
+        </p:nvPicPr>
+        <p:blipFill>
+          <a:blip r:embed="rId5">
+            <a:extLst>
+              <a:ext uri="{28A0092B-C50C-407E-A947-70E740481C1C}">
+                <a14:useLocalDpi xmlns:a14="http://schemas.microsoft.com/office/drawing/2010/main" val="0"/>
+              </a:ext>
+            </a:extLst>
+          </a:blip>
+          <a:stretch>
+            <a:fillRect/>
+          </a:stretch>
+        </p:blipFill>
+        <p:spPr>
+          <a:xfrm>
+            <a:off x="7180796" y="4191000"/>
+            <a:ext cx="1658404" cy="2133600"/>
+          </a:xfrm>
+          <a:prstGeom prst="rect">
+            <a:avLst/>
+          </a:prstGeom>
+        </p:spPr>
+      </p:pic>
     </p:spTree>
     <p:extLst>
       <p:ext uri="{BB962C8B-B14F-4D97-AF65-F5344CB8AC3E}">
@@ -4085,6 +4112,13 @@
   <p:clrMapOvr>
     <a:masterClrMapping/>
   </p:clrMapOvr>
+  <p:timing>
+    <p:tnLst>
+      <p:par>
+        <p:cTn xmlns:p14="http://schemas.microsoft.com/office/powerpoint/2010/main" id="1" dur="indefinite" restart="never" nodeType="tmRoot"/>
+      </p:par>
+    </p:tnLst>
+  </p:timing>
 </p:sld>
 </file>
 

</xml_diff>

<commit_message>
Add a transcript of my poster preview talk
</commit_message>
<xml_diff>
--- a/aspire_preview.pptx
+++ b/aspire_preview.pptx
@@ -192,7 +192,7 @@
           <a:p>
             <a:fld id="{C0783E2D-688F-4C78-8A82-0D3B92D958DC}" type="datetimeFigureOut">
               <a:rPr lang="en-US" smtClean="0"/>
-              <a:t>1/2/14</a:t>
+              <a:t>1/2/2014</a:t>
             </a:fld>
             <a:endParaRPr lang="en-US"/>
           </a:p>
@@ -505,14 +505,11 @@
           <a:lstStyle/>
           <a:p>
             <a:r>
-              <a:rPr lang="en-US" b="1" dirty="0" smtClean="0">
-                <a:solidFill>
-                  <a:srgbClr val="FF0000"/>
-                </a:solidFill>
+              <a:rPr lang="en-US" dirty="0" smtClean="0">
                 <a:latin typeface="Times" charset="0"/>
                 <a:ea typeface="ＭＳ Ｐゴシック" charset="-128"/>
               </a:rPr>
-              <a:t>Please put in notes here to explain poster so that someone else could summarize what your poster is about</a:t>
+              <a:t>Hi, I'm Palmer, a grad student here in the ASPIRE Lab.  Kevin and I built an elliptic curve cryptography engine attached via the Rocket coprocessor interface.</a:t>
             </a:r>
           </a:p>
           <a:p>
@@ -522,7 +519,135 @@
             </a:endParaRPr>
           </a:p>
           <a:p>
-            <a:endParaRPr lang="en-US" dirty="0"/>
+            <a:r>
+              <a:rPr lang="en-US" dirty="0" smtClean="0">
+                <a:latin typeface="Times" charset="0"/>
+                <a:ea typeface="ＭＳ Ｐゴシック" charset="-128"/>
+              </a:rPr>
+              <a:t>Elliptic curve cryptography is a particular sort of public key cryptography that relies on different mathematical formulations than the more widely known sorts of public-key crypto systems that are based on prime integers.  Specifically, our project focused on ECDSA, the elliptic curve digital signature algorithm, which is a widely-used NIST standard for digital signatures (if you look in your SSH's </a:t>
+            </a:r>
+            <a:r>
+              <a:rPr lang="en-US" dirty="0" err="1" smtClean="0">
+                <a:latin typeface="Times" charset="0"/>
+                <a:ea typeface="ＭＳ Ｐゴシック" charset="-128"/>
+              </a:rPr>
+              <a:t>authorized_keys</a:t>
+            </a:r>
+            <a:r>
+              <a:rPr lang="en-US" dirty="0" smtClean="0">
+                <a:latin typeface="Times" charset="0"/>
+                <a:ea typeface="ＭＳ Ｐゴシック" charset="-128"/>
+              </a:rPr>
+              <a:t> file you'll probably find some ECDSA keys).</a:t>
+            </a:r>
+          </a:p>
+          <a:p>
+            <a:endParaRPr lang="en-US" dirty="0" smtClean="0">
+              <a:latin typeface="Times" charset="0"/>
+              <a:ea typeface="ＭＳ Ｐゴシック" charset="-128"/>
+            </a:endParaRPr>
+          </a:p>
+          <a:p>
+            <a:r>
+              <a:rPr lang="en-US" dirty="0" smtClean="0">
+                <a:latin typeface="Times" charset="0"/>
+                <a:ea typeface="ＭＳ Ｐゴシック" charset="-128"/>
+              </a:rPr>
+              <a:t>ECDSA is essentially just DSA but using a different form of the discrete-logarithm problem: rather than exponentiation of prime integers we use multiplication over elliptic curves.  Elliptic curves bring one big advantage: there are no publicly known sub exponential algorithms for elliptic curve division (while there are for prime factorization).  Effectively this means that ECDSA keys are a lots </a:t>
+            </a:r>
+            <a:r>
+              <a:rPr lang="en-US" dirty="0" err="1" smtClean="0">
+                <a:latin typeface="Times" charset="0"/>
+                <a:ea typeface="ＭＳ Ｐゴシック" charset="-128"/>
+              </a:rPr>
+              <a:t>maller</a:t>
+            </a:r>
+            <a:r>
+              <a:rPr lang="en-US" dirty="0" smtClean="0">
+                <a:latin typeface="Times" charset="0"/>
+                <a:ea typeface="ＭＳ Ｐゴシック" charset="-128"/>
+              </a:rPr>
+              <a:t> than DSA keys, which makes them particularly suitable for hardware acceleration.</a:t>
+            </a:r>
+          </a:p>
+          <a:p>
+            <a:endParaRPr lang="en-US" dirty="0" smtClean="0">
+              <a:latin typeface="Times" charset="0"/>
+              <a:ea typeface="ＭＳ Ｐゴシック" charset="-128"/>
+            </a:endParaRPr>
+          </a:p>
+          <a:p>
+            <a:r>
+              <a:rPr lang="en-US" dirty="0" smtClean="0">
+                <a:latin typeface="Times" charset="0"/>
+                <a:ea typeface="ＭＳ Ｐゴシック" charset="-128"/>
+              </a:rPr>
+              <a:t>As you've probably already determined: neither of us are crypto people.  The real interesting aspect of this project was to explore hardware/software co-tuning.  ECDSA boils down to a number</a:t>
+            </a:r>
+            <a:r>
+              <a:rPr lang="en-US" baseline="0" dirty="0" smtClean="0">
+                <a:latin typeface="Times" charset="0"/>
+                <a:ea typeface="ＭＳ Ｐゴシック" charset="-128"/>
+              </a:rPr>
+              <a:t> </a:t>
+            </a:r>
+            <a:r>
+              <a:rPr lang="en-US" dirty="0" smtClean="0">
+                <a:latin typeface="Times" charset="0"/>
+                <a:ea typeface="ＭＳ Ｐゴシック" charset="-128"/>
+              </a:rPr>
+              <a:t>of mathematical operations, each of which can either be performed in dedicated hardware or on a general purpose core.  For the project, we implemented ECDSA in software in such a manner that we could run each operation on both a Rocket core and on a elliptic-curve coprocessor (which we also built RTL for).  This allows us to get a nice area vs. energy/op tradeoff by changing what was in hardware vs. software.</a:t>
+            </a:r>
+          </a:p>
+          <a:p>
+            <a:endParaRPr lang="en-US" dirty="0" smtClean="0">
+              <a:latin typeface="Times" charset="0"/>
+              <a:ea typeface="ＭＳ Ｐゴシック" charset="-128"/>
+            </a:endParaRPr>
+          </a:p>
+          <a:p>
+            <a:r>
+              <a:rPr lang="en-US" dirty="0" smtClean="0">
+                <a:latin typeface="Times" charset="0"/>
+                <a:ea typeface="ＭＳ Ｐゴシック" charset="-128"/>
+              </a:rPr>
+              <a:t>We've really only managed to scratch the surface of what can be done in this space, but in a semester we managed to get about a factor of100 improvement in energy per op as compared to </a:t>
+            </a:r>
+            <a:r>
+              <a:rPr lang="en-US" dirty="0" err="1" smtClean="0">
+                <a:latin typeface="Times" charset="0"/>
+                <a:ea typeface="ＭＳ Ｐゴシック" charset="-128"/>
+              </a:rPr>
+              <a:t>OpenSSL</a:t>
+            </a:r>
+            <a:r>
+              <a:rPr lang="en-US" dirty="0" smtClean="0">
+                <a:latin typeface="Times" charset="0"/>
+                <a:ea typeface="ＭＳ Ｐゴシック" charset="-128"/>
+              </a:rPr>
+              <a:t> on x86, </a:t>
+            </a:r>
+            <a:r>
+              <a:rPr lang="en-US" smtClean="0">
+                <a:latin typeface="Times" charset="0"/>
+                <a:ea typeface="ＭＳ Ｐゴシック" charset="-128"/>
+              </a:rPr>
+              <a:t>so I think </a:t>
+            </a:r>
+            <a:r>
+              <a:rPr lang="en-US" dirty="0" smtClean="0">
+                <a:latin typeface="Times" charset="0"/>
+                <a:ea typeface="ＭＳ Ｐゴシック" charset="-128"/>
+              </a:rPr>
+              <a:t>the preliminary results are somewhat </a:t>
+            </a:r>
+            <a:r>
+              <a:rPr lang="en-US" smtClean="0">
+                <a:latin typeface="Times" charset="0"/>
+                <a:ea typeface="ＭＳ Ｐゴシック" charset="-128"/>
+              </a:rPr>
+              <a:t>promising.</a:t>
+            </a:r>
           </a:p>
         </p:txBody>
       </p:sp>
@@ -731,7 +856,7 @@
           <a:p>
             <a:fld id="{A8FF2306-292D-41C8-8AE3-F53CB7571D2B}" type="datetimeFigureOut">
               <a:rPr lang="en-US" smtClean="0"/>
-              <a:t>1/2/14</a:t>
+              <a:t>1/2/2014</a:t>
             </a:fld>
             <a:endParaRPr lang="en-US"/>
           </a:p>
@@ -911,7 +1036,7 @@
           <a:p>
             <a:fld id="{A8FF2306-292D-41C8-8AE3-F53CB7571D2B}" type="datetimeFigureOut">
               <a:rPr lang="en-US" smtClean="0"/>
-              <a:t>1/2/14</a:t>
+              <a:t>1/2/2014</a:t>
             </a:fld>
             <a:endParaRPr lang="en-US"/>
           </a:p>
@@ -1081,7 +1206,7 @@
           <a:p>
             <a:fld id="{A8FF2306-292D-41C8-8AE3-F53CB7571D2B}" type="datetimeFigureOut">
               <a:rPr lang="en-US" smtClean="0"/>
-              <a:t>1/2/14</a:t>
+              <a:t>1/2/2014</a:t>
             </a:fld>
             <a:endParaRPr lang="en-US"/>
           </a:p>
@@ -1327,7 +1452,7 @@
           <a:p>
             <a:fld id="{A8FF2306-292D-41C8-8AE3-F53CB7571D2B}" type="datetimeFigureOut">
               <a:rPr lang="en-US" smtClean="0"/>
-              <a:t>1/2/14</a:t>
+              <a:t>1/2/2014</a:t>
             </a:fld>
             <a:endParaRPr lang="en-US"/>
           </a:p>
@@ -1615,7 +1740,7 @@
           <a:p>
             <a:fld id="{A8FF2306-292D-41C8-8AE3-F53CB7571D2B}" type="datetimeFigureOut">
               <a:rPr lang="en-US" smtClean="0"/>
-              <a:t>1/2/14</a:t>
+              <a:t>1/2/2014</a:t>
             </a:fld>
             <a:endParaRPr lang="en-US"/>
           </a:p>
@@ -2037,7 +2162,7 @@
           <a:p>
             <a:fld id="{A8FF2306-292D-41C8-8AE3-F53CB7571D2B}" type="datetimeFigureOut">
               <a:rPr lang="en-US" smtClean="0"/>
-              <a:t>1/2/14</a:t>
+              <a:t>1/2/2014</a:t>
             </a:fld>
             <a:endParaRPr lang="en-US"/>
           </a:p>
@@ -2155,7 +2280,7 @@
           <a:p>
             <a:fld id="{A8FF2306-292D-41C8-8AE3-F53CB7571D2B}" type="datetimeFigureOut">
               <a:rPr lang="en-US" smtClean="0"/>
-              <a:t>1/2/14</a:t>
+              <a:t>1/2/2014</a:t>
             </a:fld>
             <a:endParaRPr lang="en-US"/>
           </a:p>
@@ -2250,7 +2375,7 @@
           <a:p>
             <a:fld id="{A8FF2306-292D-41C8-8AE3-F53CB7571D2B}" type="datetimeFigureOut">
               <a:rPr lang="en-US" smtClean="0"/>
-              <a:t>1/2/14</a:t>
+              <a:t>1/2/2014</a:t>
             </a:fld>
             <a:endParaRPr lang="en-US"/>
           </a:p>
@@ -2527,7 +2652,7 @@
           <a:p>
             <a:fld id="{A8FF2306-292D-41C8-8AE3-F53CB7571D2B}" type="datetimeFigureOut">
               <a:rPr lang="en-US" smtClean="0"/>
-              <a:t>1/2/14</a:t>
+              <a:t>1/2/2014</a:t>
             </a:fld>
             <a:endParaRPr lang="en-US"/>
           </a:p>
@@ -2780,7 +2905,7 @@
           <a:p>
             <a:fld id="{A8FF2306-292D-41C8-8AE3-F53CB7571D2B}" type="datetimeFigureOut">
               <a:rPr lang="en-US" smtClean="0"/>
-              <a:t>1/2/14</a:t>
+              <a:t>1/2/2014</a:t>
             </a:fld>
             <a:endParaRPr lang="en-US"/>
           </a:p>
@@ -2993,7 +3118,7 @@
           <a:p>
             <a:fld id="{A8FF2306-292D-41C8-8AE3-F53CB7571D2B}" type="datetimeFigureOut">
               <a:rPr lang="en-US" smtClean="0"/>
-              <a:t>1/2/14</a:t>
+              <a:t>1/2/2014</a:t>
             </a:fld>
             <a:endParaRPr lang="en-US"/>
           </a:p>
@@ -4081,7 +4206,7 @@
           <p:nvPr/>
         </p:nvPicPr>
         <p:blipFill>
-          <a:blip r:embed="rId5">
+          <a:blip r:embed="rId5" cstate="print">
             <a:extLst>
               <a:ext uri="{28A0092B-C50C-407E-A947-70E740481C1C}">
                 <a14:useLocalDpi xmlns:a14="http://schemas.microsoft.com/office/drawing/2010/main" val="0"/>
@@ -4115,7 +4240,7 @@
   <p:timing>
     <p:tnLst>
       <p:par>
-        <p:cTn xmlns:p14="http://schemas.microsoft.com/office/powerpoint/2010/main" id="1" dur="indefinite" restart="never" nodeType="tmRoot"/>
+        <p:cTn id="1" dur="indefinite" restart="never" nodeType="tmRoot"/>
       </p:par>
     </p:tnLst>
   </p:timing>

</xml_diff>